<commit_message>
Modif Page titre présentation
</commit_message>
<xml_diff>
--- a/Gestion/S5_Revue1_2_Projet.pptx
+++ b/Gestion/S5_Revue1_2_Projet.pptx
@@ -5847,7 +5847,7 @@
       </p:grpSpPr>
       <p:sp>
         <p:nvSpPr>
-          <p:cNvPr id="2" name="Title 1"/>
+          <p:cNvPr id="18" name="Titre 1"/>
           <p:cNvSpPr>
             <a:spLocks noGrp="1"/>
           </p:cNvSpPr>
@@ -5857,45 +5857,30 @@
         </p:nvSpPr>
         <p:spPr>
           <a:xfrm>
-            <a:off x="1188091" y="903766"/>
-            <a:ext cx="7766936" cy="1956392"/>
+            <a:off x="2416818" y="2556381"/>
+            <a:ext cx="6858000" cy="1456135"/>
           </a:xfrm>
         </p:spPr>
         <p:txBody>
-          <a:bodyPr/>
+          <a:bodyPr>
+            <a:normAutofit/>
+          </a:bodyPr>
           <a:lstStyle/>
           <a:p>
             <a:pPr algn="ctr"/>
             <a:r>
-              <a:rPr lang="fr-CA" dirty="0">
+              <a:rPr lang="fr-CA" sz="4050" dirty="0">
                 <a:latin typeface="Arial" panose="020B0604020202020204" pitchFamily="34" charset="0"/>
                 <a:cs typeface="Arial" panose="020B0604020202020204" pitchFamily="34" charset="0"/>
               </a:rPr>
-              <a:t>Projet S5</a:t>
-            </a:r>
-            <a:br>
-              <a:rPr lang="fr-CA" dirty="0">
-                <a:latin typeface="Arial" panose="020B0604020202020204" pitchFamily="34" charset="0"/>
-                <a:cs typeface="Arial" panose="020B0604020202020204" pitchFamily="34" charset="0"/>
-              </a:rPr>
-            </a:br>
-            <a:r>
-              <a:rPr lang="fr-CA" dirty="0">
-                <a:latin typeface="Arial" panose="020B0604020202020204" pitchFamily="34" charset="0"/>
-                <a:cs typeface="Arial" panose="020B0604020202020204" pitchFamily="34" charset="0"/>
-              </a:rPr>
-              <a:t>Revue 1 &amp; 2</a:t>
-            </a:r>
-            <a:endParaRPr lang="en-CA" dirty="0">
-              <a:latin typeface="Arial" panose="020B0604020202020204" pitchFamily="34" charset="0"/>
-              <a:cs typeface="Arial" panose="020B0604020202020204" pitchFamily="34" charset="0"/>
-            </a:endParaRPr>
-          </a:p>
-        </p:txBody>
-      </p:sp>
-      <p:sp>
-        <p:nvSpPr>
-          <p:cNvPr id="3" name="Subtitle 2"/>
+              <a:t>Revue 1&amp;2</a:t>
+            </a:r>
+          </a:p>
+        </p:txBody>
+      </p:sp>
+      <p:sp>
+        <p:nvSpPr>
+          <p:cNvPr id="19" name="Sous-titre 2"/>
           <p:cNvSpPr>
             <a:spLocks noGrp="1"/>
           </p:cNvSpPr>
@@ -5905,8 +5890,8 @@
         </p:nvSpPr>
         <p:spPr>
           <a:xfrm>
-            <a:off x="1113662" y="3125801"/>
-            <a:ext cx="7766936" cy="1096899"/>
+            <a:off x="2416818" y="4403906"/>
+            <a:ext cx="6858000" cy="1241822"/>
           </a:xfrm>
         </p:spPr>
         <p:txBody>
@@ -5917,10 +5902,220 @@
           <a:p>
             <a:pPr algn="ctr"/>
             <a:r>
-              <a:rPr lang="fr-CA" sz="2400" dirty="0"/>
-              <a:t>Équipe P4</a:t>
-            </a:r>
-            <a:endParaRPr lang="en-CA" sz="2400" dirty="0"/>
+              <a:rPr lang="fr-CA" dirty="0"/>
+              <a:t>Par:</a:t>
+            </a:r>
+          </a:p>
+          <a:p>
+            <a:pPr algn="ctr"/>
+            <a:r>
+              <a:rPr lang="fr-CA" dirty="0"/>
+              <a:t>Équipe 4</a:t>
+            </a:r>
+          </a:p>
+        </p:txBody>
+      </p:sp>
+      <p:sp>
+        <p:nvSpPr>
+          <p:cNvPr id="20" name="Rectangle 2"/>
+          <p:cNvSpPr>
+            <a:spLocks noChangeArrowheads="1"/>
+          </p:cNvSpPr>
+          <p:nvPr/>
+        </p:nvSpPr>
+        <p:spPr bwMode="auto">
+          <a:xfrm>
+            <a:off x="1717165" y="1285056"/>
+            <a:ext cx="138564" cy="276999"/>
+          </a:xfrm>
+          <a:prstGeom prst="rect">
+            <a:avLst/>
+          </a:prstGeom>
+          <a:noFill/>
+          <a:ln>
+            <a:noFill/>
+          </a:ln>
+          <a:effectLst/>
+          <a:extLst>
+            <a:ext uri="{909E8E84-426E-40DD-AFC4-6F175D3DCCD1}">
+              <a14:hiddenFill xmlns:a14="http://schemas.microsoft.com/office/drawing/2010/main">
+                <a:solidFill>
+                  <a:schemeClr val="accent1"/>
+                </a:solidFill>
+              </a14:hiddenFill>
+            </a:ext>
+            <a:ext uri="{91240B29-F687-4F45-9708-019B960494DF}">
+              <a14:hiddenLine xmlns:a14="http://schemas.microsoft.com/office/drawing/2010/main" w="9525">
+                <a:solidFill>
+                  <a:schemeClr val="tx1"/>
+                </a:solidFill>
+                <a:miter lim="800000"/>
+                <a:headEnd/>
+                <a:tailEnd/>
+              </a14:hiddenLine>
+            </a:ext>
+            <a:ext uri="{AF507438-7753-43E0-B8FC-AC1667EBCBE1}">
+              <a14:hiddenEffects xmlns:a14="http://schemas.microsoft.com/office/drawing/2010/main">
+                <a:effectLst>
+                  <a:outerShdw dist="35921" dir="2700000" algn="ctr" rotWithShape="0">
+                    <a:schemeClr val="bg2"/>
+                  </a:outerShdw>
+                </a:effectLst>
+              </a14:hiddenEffects>
+            </a:ext>
+          </a:extLst>
+        </p:spPr>
+        <p:txBody>
+          <a:bodyPr vert="horz" wrap="none" lIns="68580" tIns="34290" rIns="68580" bIns="34290" numCol="1" anchor="ctr" anchorCtr="0" compatLnSpc="1">
+            <a:prstTxWarp prst="textNoShape">
+              <a:avLst/>
+            </a:prstTxWarp>
+            <a:spAutoFit/>
+          </a:bodyPr>
+          <a:lstStyle/>
+          <a:p>
+            <a:endParaRPr lang="fr-CA" sz="1350"/>
+          </a:p>
+        </p:txBody>
+      </p:sp>
+      <p:pic>
+        <p:nvPicPr>
+          <p:cNvPr id="21" name="Picture 1" descr="usherbrooke"/>
+          <p:cNvPicPr>
+            <a:picLocks noChangeAspect="1" noChangeArrowheads="1"/>
+          </p:cNvPicPr>
+          <p:nvPr/>
+        </p:nvPicPr>
+        <p:blipFill>
+          <a:blip r:embed="rId2" cstate="print">
+            <a:extLst>
+              <a:ext uri="{28A0092B-C50C-407E-A947-70E740481C1C}">
+                <a14:useLocalDpi xmlns:a14="http://schemas.microsoft.com/office/drawing/2010/main" val="0"/>
+              </a:ext>
+            </a:extLst>
+          </a:blip>
+          <a:srcRect/>
+          <a:stretch>
+            <a:fillRect/>
+          </a:stretch>
+        </p:blipFill>
+        <p:spPr bwMode="auto">
+          <a:xfrm>
+            <a:off x="4005227" y="1252105"/>
+            <a:ext cx="3681182" cy="625890"/>
+          </a:xfrm>
+          <a:prstGeom prst="rect">
+            <a:avLst/>
+          </a:prstGeom>
+          <a:noFill/>
+          <a:extLst>
+            <a:ext uri="{909E8E84-426E-40DD-AFC4-6F175D3DCCD1}">
+              <a14:hiddenFill xmlns:a14="http://schemas.microsoft.com/office/drawing/2010/main">
+                <a:solidFill>
+                  <a:srgbClr val="FFFFFF"/>
+                </a:solidFill>
+              </a14:hiddenFill>
+            </a:ext>
+          </a:extLst>
+        </p:spPr>
+      </p:pic>
+      <p:sp>
+        <p:nvSpPr>
+          <p:cNvPr id="22" name="Rectangle 3"/>
+          <p:cNvSpPr>
+            <a:spLocks noChangeArrowheads="1"/>
+          </p:cNvSpPr>
+          <p:nvPr/>
+        </p:nvSpPr>
+        <p:spPr bwMode="auto">
+          <a:xfrm>
+            <a:off x="4472525" y="1879891"/>
+            <a:ext cx="2746586" cy="346249"/>
+          </a:xfrm>
+          <a:prstGeom prst="rect">
+            <a:avLst/>
+          </a:prstGeom>
+          <a:noFill/>
+          <a:ln>
+            <a:noFill/>
+          </a:ln>
+          <a:effectLst/>
+          <a:extLst>
+            <a:ext uri="{909E8E84-426E-40DD-AFC4-6F175D3DCCD1}">
+              <a14:hiddenFill xmlns:a14="http://schemas.microsoft.com/office/drawing/2010/main">
+                <a:solidFill>
+                  <a:schemeClr val="accent1"/>
+                </a:solidFill>
+              </a14:hiddenFill>
+            </a:ext>
+            <a:ext uri="{91240B29-F687-4F45-9708-019B960494DF}">
+              <a14:hiddenLine xmlns:a14="http://schemas.microsoft.com/office/drawing/2010/main" w="9525">
+                <a:solidFill>
+                  <a:schemeClr val="tx1"/>
+                </a:solidFill>
+                <a:miter lim="800000"/>
+                <a:headEnd/>
+                <a:tailEnd/>
+              </a14:hiddenLine>
+            </a:ext>
+            <a:ext uri="{AF507438-7753-43E0-B8FC-AC1667EBCBE1}">
+              <a14:hiddenEffects xmlns:a14="http://schemas.microsoft.com/office/drawing/2010/main">
+                <a:effectLst>
+                  <a:outerShdw dist="35921" dir="2700000" algn="ctr" rotWithShape="0">
+                    <a:schemeClr val="bg2"/>
+                  </a:outerShdw>
+                </a:effectLst>
+              </a14:hiddenEffects>
+            </a:ext>
+          </a:extLst>
+        </p:spPr>
+        <p:txBody>
+          <a:bodyPr vert="horz" wrap="none" lIns="68580" tIns="34290" rIns="68580" bIns="34290" numCol="1" anchor="ctr" anchorCtr="0" compatLnSpc="1">
+            <a:prstTxWarp prst="textNoShape">
+              <a:avLst/>
+            </a:prstTxWarp>
+            <a:spAutoFit/>
+          </a:bodyPr>
+          <a:lstStyle/>
+          <a:p>
+            <a:pPr algn="ctr" defTabSz="685800" eaLnBrk="0" fontAlgn="base" hangingPunct="0">
+              <a:spcBef>
+                <a:spcPct val="0"/>
+              </a:spcBef>
+              <a:spcAft>
+                <a:spcPct val="0"/>
+              </a:spcAft>
+            </a:pPr>
+            <a:r>
+              <a:rPr lang="fr-CA" altLang="fr-FR" sz="900" dirty="0">
+                <a:latin typeface="Calibri" panose="020F0502020204030204" pitchFamily="34" charset="0"/>
+                <a:ea typeface="Times New Roman" panose="02020603050405020304" pitchFamily="18" charset="0"/>
+                <a:cs typeface="Times New Roman" panose="02020603050405020304" pitchFamily="18" charset="0"/>
+              </a:rPr>
+              <a:t>Faculté de génie</a:t>
+            </a:r>
+            <a:endParaRPr lang="fr-CA" altLang="fr-FR" sz="600" dirty="0"/>
+          </a:p>
+          <a:p>
+            <a:pPr algn="ctr" defTabSz="685800" eaLnBrk="0" fontAlgn="base" hangingPunct="0">
+              <a:spcBef>
+                <a:spcPct val="0"/>
+              </a:spcBef>
+              <a:spcAft>
+                <a:spcPct val="0"/>
+              </a:spcAft>
+            </a:pPr>
+            <a:r>
+              <a:rPr lang="fr-CA" altLang="fr-FR" sz="900" dirty="0">
+                <a:latin typeface="Calibri" panose="020F0502020204030204" pitchFamily="34" charset="0"/>
+                <a:ea typeface="Times New Roman" panose="02020603050405020304" pitchFamily="18" charset="0"/>
+                <a:cs typeface="Times New Roman" panose="02020603050405020304" pitchFamily="18" charset="0"/>
+              </a:rPr>
+              <a:t>Département de génie électrique et génie informatique</a:t>
+            </a:r>
+            <a:endParaRPr lang="fr-CA" altLang="fr-FR" sz="1350" dirty="0">
+              <a:latin typeface="Arial" panose="020B0604020202020204" pitchFamily="34" charset="0"/>
+            </a:endParaRPr>
           </a:p>
         </p:txBody>
       </p:sp>

</xml_diff>